<commit_message>
Added things in the presentation
</commit_message>
<xml_diff>
--- a/Presentatie/Intro_Presentatie.pptx
+++ b/Presentatie/Intro_Presentatie.pptx
@@ -254,11 +254,11 @@
         </c:dLbls>
         <c:marker val="1"/>
         <c:smooth val="0"/>
-        <c:axId val="40327168"/>
-        <c:axId val="107987520"/>
+        <c:axId val="119776256"/>
+        <c:axId val="113418816"/>
       </c:lineChart>
       <c:catAx>
-        <c:axId val="40327168"/>
+        <c:axId val="119776256"/>
         <c:scaling>
           <c:orientation val="minMax"/>
         </c:scaling>
@@ -288,7 +288,7 @@
         <c:majorTickMark val="out"/>
         <c:minorTickMark val="none"/>
         <c:tickLblPos val="nextTo"/>
-        <c:crossAx val="107987520"/>
+        <c:crossAx val="113418816"/>
         <c:crosses val="autoZero"/>
         <c:auto val="1"/>
         <c:lblAlgn val="ctr"/>
@@ -296,7 +296,7 @@
         <c:noMultiLvlLbl val="0"/>
       </c:catAx>
       <c:valAx>
-        <c:axId val="107987520"/>
+        <c:axId val="113418816"/>
         <c:scaling>
           <c:orientation val="minMax"/>
         </c:scaling>
@@ -326,7 +326,7 @@
         <c:majorTickMark val="out"/>
         <c:minorTickMark val="none"/>
         <c:tickLblPos val="nextTo"/>
-        <c:crossAx val="40327168"/>
+        <c:crossAx val="119776256"/>
         <c:crosses val="autoZero"/>
         <c:crossBetween val="between"/>
       </c:valAx>
@@ -480,11 +480,11 @@
         </c:dLbls>
         <c:marker val="1"/>
         <c:smooth val="0"/>
-        <c:axId val="39667712"/>
-        <c:axId val="119741184"/>
+        <c:axId val="116195328"/>
+        <c:axId val="113421696"/>
       </c:lineChart>
       <c:catAx>
-        <c:axId val="39667712"/>
+        <c:axId val="116195328"/>
         <c:scaling>
           <c:orientation val="minMax"/>
         </c:scaling>
@@ -514,7 +514,7 @@
         <c:majorTickMark val="out"/>
         <c:minorTickMark val="none"/>
         <c:tickLblPos val="nextTo"/>
-        <c:crossAx val="119741184"/>
+        <c:crossAx val="113421696"/>
         <c:crosses val="autoZero"/>
         <c:auto val="1"/>
         <c:lblAlgn val="ctr"/>
@@ -522,7 +522,7 @@
         <c:noMultiLvlLbl val="0"/>
       </c:catAx>
       <c:valAx>
-        <c:axId val="119741184"/>
+        <c:axId val="113421696"/>
         <c:scaling>
           <c:orientation val="minMax"/>
         </c:scaling>
@@ -552,7 +552,7 @@
         <c:majorTickMark val="out"/>
         <c:minorTickMark val="none"/>
         <c:tickLblPos val="nextTo"/>
-        <c:crossAx val="39667712"/>
+        <c:crossAx val="116195328"/>
         <c:crosses val="autoZero"/>
         <c:crossBetween val="between"/>
       </c:valAx>
@@ -649,7 +649,7 @@
           <a:p>
             <a:fld id="{8A117A46-6A05-4959-BAE6-40974690F270}" type="datetimeFigureOut">
               <a:rPr lang="nl-NL" smtClean="0"/>
-              <a:t>4-1-2016</a:t>
+              <a:t>7-1-2016</a:t>
             </a:fld>
             <a:endParaRPr lang="nl-NL"/>
           </a:p>
@@ -1187,7 +1187,7 @@
           <a:p>
             <a:fld id="{09545E81-40EA-4ED1-862B-A0A5598D8AE1}" type="datetimeFigureOut">
               <a:rPr lang="nl-NL" smtClean="0"/>
-              <a:t>4-1-2016</a:t>
+              <a:t>7-1-2016</a:t>
             </a:fld>
             <a:endParaRPr lang="nl-NL"/>
           </a:p>
@@ -1357,7 +1357,7 @@
           <a:p>
             <a:fld id="{09545E81-40EA-4ED1-862B-A0A5598D8AE1}" type="datetimeFigureOut">
               <a:rPr lang="nl-NL" smtClean="0"/>
-              <a:t>4-1-2016</a:t>
+              <a:t>7-1-2016</a:t>
             </a:fld>
             <a:endParaRPr lang="nl-NL"/>
           </a:p>
@@ -1537,7 +1537,7 @@
           <a:p>
             <a:fld id="{09545E81-40EA-4ED1-862B-A0A5598D8AE1}" type="datetimeFigureOut">
               <a:rPr lang="nl-NL" smtClean="0"/>
-              <a:t>4-1-2016</a:t>
+              <a:t>7-1-2016</a:t>
             </a:fld>
             <a:endParaRPr lang="nl-NL"/>
           </a:p>
@@ -1707,7 +1707,7 @@
           <a:p>
             <a:fld id="{09545E81-40EA-4ED1-862B-A0A5598D8AE1}" type="datetimeFigureOut">
               <a:rPr lang="nl-NL" smtClean="0"/>
-              <a:t>4-1-2016</a:t>
+              <a:t>7-1-2016</a:t>
             </a:fld>
             <a:endParaRPr lang="nl-NL"/>
           </a:p>
@@ -1953,7 +1953,7 @@
           <a:p>
             <a:fld id="{09545E81-40EA-4ED1-862B-A0A5598D8AE1}" type="datetimeFigureOut">
               <a:rPr lang="nl-NL" smtClean="0"/>
-              <a:t>4-1-2016</a:t>
+              <a:t>7-1-2016</a:t>
             </a:fld>
             <a:endParaRPr lang="nl-NL"/>
           </a:p>
@@ -2241,7 +2241,7 @@
           <a:p>
             <a:fld id="{09545E81-40EA-4ED1-862B-A0A5598D8AE1}" type="datetimeFigureOut">
               <a:rPr lang="nl-NL" smtClean="0"/>
-              <a:t>4-1-2016</a:t>
+              <a:t>7-1-2016</a:t>
             </a:fld>
             <a:endParaRPr lang="nl-NL"/>
           </a:p>
@@ -2663,7 +2663,7 @@
           <a:p>
             <a:fld id="{09545E81-40EA-4ED1-862B-A0A5598D8AE1}" type="datetimeFigureOut">
               <a:rPr lang="nl-NL" smtClean="0"/>
-              <a:t>4-1-2016</a:t>
+              <a:t>7-1-2016</a:t>
             </a:fld>
             <a:endParaRPr lang="nl-NL"/>
           </a:p>
@@ -2781,7 +2781,7 @@
           <a:p>
             <a:fld id="{09545E81-40EA-4ED1-862B-A0A5598D8AE1}" type="datetimeFigureOut">
               <a:rPr lang="nl-NL" smtClean="0"/>
-              <a:t>4-1-2016</a:t>
+              <a:t>7-1-2016</a:t>
             </a:fld>
             <a:endParaRPr lang="nl-NL"/>
           </a:p>
@@ -2876,7 +2876,7 @@
           <a:p>
             <a:fld id="{09545E81-40EA-4ED1-862B-A0A5598D8AE1}" type="datetimeFigureOut">
               <a:rPr lang="nl-NL" smtClean="0"/>
-              <a:t>4-1-2016</a:t>
+              <a:t>7-1-2016</a:t>
             </a:fld>
             <a:endParaRPr lang="nl-NL"/>
           </a:p>
@@ -3153,7 +3153,7 @@
           <a:p>
             <a:fld id="{09545E81-40EA-4ED1-862B-A0A5598D8AE1}" type="datetimeFigureOut">
               <a:rPr lang="nl-NL" smtClean="0"/>
-              <a:t>4-1-2016</a:t>
+              <a:t>7-1-2016</a:t>
             </a:fld>
             <a:endParaRPr lang="nl-NL"/>
           </a:p>
@@ -3406,7 +3406,7 @@
           <a:p>
             <a:fld id="{09545E81-40EA-4ED1-862B-A0A5598D8AE1}" type="datetimeFigureOut">
               <a:rPr lang="nl-NL" smtClean="0"/>
-              <a:t>4-1-2016</a:t>
+              <a:t>7-1-2016</a:t>
             </a:fld>
             <a:endParaRPr lang="nl-NL"/>
           </a:p>
@@ -3619,7 +3619,7 @@
           <a:p>
             <a:fld id="{09545E81-40EA-4ED1-862B-A0A5598D8AE1}" type="datetimeFigureOut">
               <a:rPr lang="nl-NL" smtClean="0"/>
-              <a:t>4-1-2016</a:t>
+              <a:t>7-1-2016</a:t>
             </a:fld>
             <a:endParaRPr lang="nl-NL"/>
           </a:p>
@@ -4074,7 +4074,11 @@
             <a:pPr algn="r"/>
             <a:r>
               <a:rPr lang="nl-NL" sz="2800" dirty="0" smtClean="0"/>
-              <a:t>Group 03</a:t>
+              <a:t>Group </a:t>
+            </a:r>
+            <a:r>
+              <a:rPr lang="nl-NL" sz="2800" dirty="0" smtClean="0"/>
+              <a:t>03: Wout, Karim, Roy</a:t>
             </a:r>
             <a:endParaRPr lang="nl-NL" sz="2800" dirty="0"/>
           </a:p>
@@ -4376,7 +4380,45 @@
                   </a:schemeClr>
                 </a:solidFill>
               </a:rPr>
-              <a:t>Hoe we t </a:t>
+              <a:t>Analyze the number of Tweets containing key words per day:</a:t>
+            </a:r>
+          </a:p>
+          <a:p>
+            <a:pPr marL="0" indent="0">
+              <a:buNone/>
+            </a:pPr>
+            <a:r>
+              <a:rPr lang="en-US" dirty="0" smtClean="0">
+                <a:solidFill>
+                  <a:schemeClr val="tx1">
+                    <a:lumMod val="75000"/>
+                    <a:lumOff val="25000"/>
+                  </a:schemeClr>
+                </a:solidFill>
+              </a:rPr>
+              <a:t>    “</a:t>
+            </a:r>
+            <a:r>
+              <a:rPr lang="en-US" dirty="0">
+                <a:solidFill>
+                  <a:schemeClr val="tx1">
+                    <a:lumMod val="75000"/>
+                    <a:lumOff val="25000"/>
+                  </a:schemeClr>
+                </a:solidFill>
+              </a:rPr>
+              <a:t>ZZP</a:t>
+            </a:r>
+            <a:r>
+              <a:rPr lang="en-US" dirty="0" smtClean="0">
+                <a:solidFill>
+                  <a:schemeClr val="tx1">
+                    <a:lumMod val="75000"/>
+                    <a:lumOff val="25000"/>
+                  </a:schemeClr>
+                </a:solidFill>
+              </a:rPr>
+              <a:t>”, “@</a:t>
             </a:r>
             <a:r>
               <a:rPr lang="en-US" dirty="0" err="1" smtClean="0">
@@ -4387,7 +4429,7 @@
                   </a:schemeClr>
                 </a:solidFill>
               </a:rPr>
-              <a:t>gaan</a:t>
+              <a:t>StZZPNederland</a:t>
             </a:r>
             <a:r>
               <a:rPr lang="en-US" dirty="0" smtClean="0">
@@ -4398,7 +4440,7 @@
                   </a:schemeClr>
                 </a:solidFill>
               </a:rPr>
-              <a:t> </a:t>
+              <a:t>”, “@</a:t>
             </a:r>
             <a:r>
               <a:rPr lang="en-US" dirty="0" err="1" smtClean="0">
@@ -4409,7 +4451,42 @@
                   </a:schemeClr>
                 </a:solidFill>
               </a:rPr>
-              <a:t>doen</a:t>
+              <a:t>ZPnetwerk</a:t>
+            </a:r>
+            <a:r>
+              <a:rPr lang="en-US" dirty="0" smtClean="0">
+                <a:solidFill>
+                  <a:schemeClr val="tx1">
+                    <a:lumMod val="75000"/>
+                    <a:lumOff val="25000"/>
+                  </a:schemeClr>
+                </a:solidFill>
+              </a:rPr>
+              <a:t>”</a:t>
+            </a:r>
+          </a:p>
+          <a:p>
+            <a:r>
+              <a:rPr lang="en-US" dirty="0" smtClean="0">
+                <a:solidFill>
+                  <a:schemeClr val="tx1">
+                    <a:lumMod val="75000"/>
+                    <a:lumOff val="25000"/>
+                  </a:schemeClr>
+                </a:solidFill>
+              </a:rPr>
+              <a:t>Possibly extend using data from the </a:t>
+            </a:r>
+            <a:r>
+              <a:rPr lang="en-US" dirty="0" err="1" smtClean="0">
+                <a:solidFill>
+                  <a:schemeClr val="tx1">
+                    <a:lumMod val="75000"/>
+                    <a:lumOff val="25000"/>
+                  </a:schemeClr>
+                </a:solidFill>
+              </a:rPr>
+              <a:t>KvK</a:t>
             </a:r>
             <a:endParaRPr lang="en-GB" dirty="0">
               <a:solidFill>

</xml_diff>